<commit_message>
letzte änderungen an der präsentation vorgenommen
</commit_message>
<xml_diff>
--- a/hall presentation.pptx
+++ b/hall presentation.pptx
@@ -488,7 +488,7 @@
     </p:spTree>
     <p:extLst>
       <p:ext uri="{BB962C8B-B14F-4D97-AF65-F5344CB8AC3E}">
-        <p14:creationId xmlns="" xmlns:p14="http://schemas.microsoft.com/office/powerpoint/2010/main" val="1351901342"/>
+        <p14:creationId xmlns:p14="http://schemas.microsoft.com/office/powerpoint/2010/main" xmlns="" val="1351901342"/>
       </p:ext>
     </p:extLst>
   </p:cSld>
@@ -3921,20 +3921,12 @@
               <a:rPr lang="de-DE" b="1" dirty="0" smtClean="0"/>
               <a:t>Signalprozessortechnik</a:t>
             </a:r>
-            <a:r>
-              <a:rPr lang="de-DE" b="1" dirty="0" smtClean="0"/>
-              <a:t/>
-            </a:r>
             <a:br>
               <a:rPr lang="de-DE" b="1" dirty="0" smtClean="0"/>
             </a:br>
             <a:r>
               <a:rPr lang="de-DE" b="1" dirty="0" smtClean="0"/>
-              <a:t>		</a:t>
-            </a:r>
-            <a:r>
-              <a:rPr lang="de-DE" b="1" dirty="0" smtClean="0"/>
-              <a:t>Projektarbeit – „Hall“</a:t>
+              <a:t>		Projektarbeit – „Hall“</a:t>
             </a:r>
             <a:endParaRPr lang="de-DE" b="1" dirty="0"/>
           </a:p>
@@ -3958,7 +3950,7 @@
             <a:fld id="{5EDF824B-C556-438F-A7B6-11338662A465}" type="datetime1">
               <a:rPr lang="de-DE" smtClean="0"/>
               <a:pPr/>
-              <a:t>29.07.2012</a:t>
+              <a:t>30.07.2012</a:t>
             </a:fld>
             <a:endParaRPr lang="de-DE" dirty="0"/>
           </a:p>
@@ -4224,7 +4216,7 @@
             <a:fld id="{5871B3EA-D9F8-4156-97BF-B4B397DC4D61}" type="datetime1">
               <a:rPr lang="de-DE" smtClean="0"/>
               <a:pPr/>
-              <a:t>29.07.2012</a:t>
+              <a:t>30.07.2012</a:t>
             </a:fld>
             <a:endParaRPr lang="de-DE" dirty="0"/>
           </a:p>
@@ -4330,15 +4322,80 @@
             </a:pPr>
             <a:r>
               <a:rPr lang="de-DE" dirty="0" smtClean="0"/>
-              <a:t> </a:t>
-            </a:r>
-            <a:r>
-              <a:rPr lang="de-DE" dirty="0" smtClean="0"/>
-              <a:t>Buffer als Ringspeicher mit laufendem </a:t>
+              <a:t> Buffer als Ringspeicher mit laufendem </a:t>
             </a:r>
             <a:r>
               <a:rPr lang="de-DE" dirty="0" smtClean="0"/>
               <a:t>Index</a:t>
+            </a:r>
+          </a:p>
+          <a:p>
+            <a:pPr>
+              <a:buFont typeface="Arial" pitchFamily="34" charset="0"/>
+              <a:buChar char="•"/>
+            </a:pPr>
+            <a:r>
+              <a:rPr lang="de-DE" dirty="0" smtClean="0"/>
+              <a:t>Abgriff vom Buffer relativ zu neuestem Wert</a:t>
+            </a:r>
+            <a:endParaRPr lang="de-DE" dirty="0" smtClean="0"/>
+          </a:p>
+          <a:p>
+            <a:pPr>
+              <a:buFont typeface="Arial" pitchFamily="34" charset="0"/>
+              <a:buChar char="•"/>
+            </a:pPr>
+            <a:endParaRPr lang="de-DE" smtClean="0"/>
+          </a:p>
+          <a:p>
+            <a:pPr>
+              <a:buFont typeface="Arial" pitchFamily="34" charset="0"/>
+              <a:buChar char="•"/>
+            </a:pPr>
+            <a:r>
+              <a:rPr lang="de-DE" smtClean="0"/>
+              <a:t> </a:t>
+            </a:r>
+            <a:r>
+              <a:rPr lang="de-DE" dirty="0" smtClean="0"/>
+              <a:t>Ringspeicher mit 4096 Werten </a:t>
+            </a:r>
+          </a:p>
+          <a:p>
+            <a:r>
+              <a:rPr lang="de-DE" dirty="0" smtClean="0">
+                <a:sym typeface="Wingdings" pitchFamily="2" charset="2"/>
+              </a:rPr>
+              <a:t>	</a:t>
+            </a:r>
+            <a:r>
+              <a:rPr lang="de-DE" dirty="0" smtClean="0"/>
+              <a:t> inkrementierung des Index und AND mit 0x0fff </a:t>
+            </a:r>
+          </a:p>
+          <a:p>
+            <a:r>
+              <a:rPr lang="de-DE" dirty="0" smtClean="0"/>
+              <a:t>	</a:t>
+            </a:r>
+          </a:p>
+          <a:p>
+            <a:r>
+              <a:rPr lang="de-DE" dirty="0" smtClean="0"/>
+              <a:t>	   Dezimal: 4095    Binär: 0000 1111 1111 1111</a:t>
+            </a:r>
+          </a:p>
+          <a:p>
+            <a:endParaRPr lang="de-DE" dirty="0" smtClean="0"/>
+          </a:p>
+          <a:p>
+            <a:pPr>
+              <a:buFont typeface="Arial" pitchFamily="34" charset="0"/>
+              <a:buChar char="•"/>
+            </a:pPr>
+            <a:r>
+              <a:rPr lang="de-DE" dirty="0" smtClean="0"/>
+              <a:t> Koeffizienten für neuen Wert und Rückkopplung als 2er Potenz, daher reicht Schieben</a:t>
             </a:r>
           </a:p>
           <a:p>
@@ -4348,86 +4405,12 @@
             </a:pPr>
             <a:endParaRPr lang="de-DE" dirty="0" smtClean="0"/>
           </a:p>
-          <a:p>
-            <a:pPr>
-              <a:buFont typeface="Arial" pitchFamily="34" charset="0"/>
-              <a:buChar char="•"/>
-            </a:pPr>
-            <a:r>
-              <a:rPr lang="de-DE" dirty="0" smtClean="0"/>
-              <a:t> Ringspeicher mit 4096 </a:t>
-            </a:r>
-            <a:r>
-              <a:rPr lang="de-DE" dirty="0" smtClean="0"/>
-              <a:t>Werten </a:t>
-            </a:r>
-          </a:p>
-          <a:p>
-            <a:r>
-              <a:rPr lang="de-DE" dirty="0" smtClean="0">
-                <a:sym typeface="Wingdings" pitchFamily="2" charset="2"/>
-              </a:rPr>
-              <a:t>	</a:t>
-            </a:r>
-            <a:r>
-              <a:rPr lang="de-DE" dirty="0" smtClean="0"/>
-              <a:t> </a:t>
-            </a:r>
-            <a:r>
-              <a:rPr lang="de-DE" dirty="0" smtClean="0"/>
-              <a:t>inkrementierung des Index und AND mit 0x0fff </a:t>
-            </a:r>
-          </a:p>
-          <a:p>
-            <a:r>
-              <a:rPr lang="de-DE" dirty="0" smtClean="0"/>
-              <a:t>	</a:t>
-            </a:r>
-          </a:p>
-          <a:p>
-            <a:r>
-              <a:rPr lang="de-DE" dirty="0" smtClean="0"/>
-              <a:t>	</a:t>
-            </a:r>
-            <a:r>
-              <a:rPr lang="de-DE" dirty="0" smtClean="0"/>
-              <a:t>   </a:t>
-            </a:r>
-            <a:r>
-              <a:rPr lang="de-DE" dirty="0" smtClean="0"/>
-              <a:t>Dezimal: 4095    Binär: 0000 1111 1111 </a:t>
-            </a:r>
-            <a:r>
-              <a:rPr lang="de-DE" dirty="0" smtClean="0"/>
-              <a:t>1111</a:t>
-            </a:r>
-          </a:p>
-          <a:p>
-            <a:endParaRPr lang="de-DE" dirty="0" smtClean="0"/>
-          </a:p>
-          <a:p>
-            <a:pPr>
-              <a:buFont typeface="Arial" pitchFamily="34" charset="0"/>
-              <a:buChar char="•"/>
-            </a:pPr>
-            <a:r>
-              <a:rPr lang="de-DE" dirty="0" smtClean="0"/>
-              <a:t> Koeffizienten für neuen Wert und Rückkopplung als 2er Potenz, daher reicht Schieben</a:t>
-            </a:r>
-          </a:p>
-          <a:p>
-            <a:pPr>
-              <a:buFont typeface="Arial" pitchFamily="34" charset="0"/>
-              <a:buChar char="•"/>
-            </a:pPr>
-            <a:endParaRPr lang="de-DE" dirty="0" smtClean="0"/>
-          </a:p>
         </p:txBody>
       </p:sp>
     </p:spTree>
     <p:extLst>
       <p:ext uri="{BB962C8B-B14F-4D97-AF65-F5344CB8AC3E}">
-        <p14:creationId xmlns="" xmlns:p14="http://schemas.microsoft.com/office/powerpoint/2010/main" val="2201789882"/>
+        <p14:creationId xmlns:p14="http://schemas.microsoft.com/office/powerpoint/2010/main" xmlns="" val="2201789882"/>
       </p:ext>
     </p:extLst>
   </p:cSld>
@@ -4507,7 +4490,7 @@
             <a:fld id="{5871B3EA-D9F8-4156-97BF-B4B397DC4D61}" type="datetime1">
               <a:rPr lang="de-DE" smtClean="0"/>
               <a:pPr/>
-              <a:t>29.07.2012</a:t>
+              <a:t>30.07.2012</a:t>
             </a:fld>
             <a:endParaRPr lang="de-DE" dirty="0"/>
           </a:p>
@@ -4600,11 +4583,7 @@
             </a:pPr>
             <a:r>
               <a:rPr lang="de-DE" sz="1800" dirty="0" smtClean="0"/>
-              <a:t>Vorlesungsskript Signalprozessortechnik, </a:t>
-            </a:r>
-            <a:r>
-              <a:rPr lang="de-DE" sz="1800" dirty="0" smtClean="0"/>
-              <a:t>SS2012</a:t>
+              <a:t>Vorlesungsskript Signalprozessortechnik, SS2012</a:t>
             </a:r>
           </a:p>
           <a:p>
@@ -4621,31 +4600,7 @@
             </a:pPr>
             <a:r>
               <a:rPr lang="de-DE" sz="1800" dirty="0" smtClean="0"/>
-              <a:t>Versuchsanleitung </a:t>
-            </a:r>
-            <a:r>
-              <a:rPr lang="de-DE" sz="1800" dirty="0" smtClean="0"/>
-              <a:t>Nr. 2 </a:t>
-            </a:r>
-            <a:r>
-              <a:rPr lang="de-DE" sz="1800" dirty="0" smtClean="0"/>
-              <a:t>„Digitale Filter“, </a:t>
-            </a:r>
-            <a:r>
-              <a:rPr lang="de-DE" sz="1800" dirty="0" smtClean="0"/>
-              <a:t>Praktikum zur Veranstaltung </a:t>
-            </a:r>
-            <a:r>
-              <a:rPr lang="de-DE" sz="1800" dirty="0" smtClean="0"/>
-              <a:t> „Digi-tale Signalverarbeitung“ </a:t>
-            </a:r>
-            <a:r>
-              <a:rPr lang="de-DE" sz="1800" dirty="0" smtClean="0"/>
-              <a:t>Institut für Nachrichtentechnik, Universität </a:t>
-            </a:r>
-            <a:r>
-              <a:rPr lang="de-DE" sz="1800" dirty="0" smtClean="0"/>
-              <a:t>Rostock</a:t>
+              <a:t>Versuchsanleitung Nr. 2 „Digitale Filter“, Praktikum zur Veranstaltung  „Digi-tale Signalverarbeitung“ Institut für Nachrichtentechnik, Universität Rostock</a:t>
             </a:r>
           </a:p>
           <a:p>
@@ -4662,11 +4617,7 @@
             </a:pPr>
             <a:r>
               <a:rPr lang="de-DE" sz="1800" dirty="0" smtClean="0"/>
-              <a:t>http://feedingthepuppy.typepad.com/.</a:t>
-            </a:r>
-            <a:r>
-              <a:rPr lang="de-DE" sz="1800" dirty="0" smtClean="0"/>
-              <a:t>a/6a00e550f4976688340147e05708ca970b-800wi</a:t>
+              <a:t>http://feedingthepuppy.typepad.com/.a/6a00e550f4976688340147e05708ca970b-800wi</a:t>
             </a:r>
           </a:p>
           <a:p>
@@ -4683,11 +4634,7 @@
             </a:pPr>
             <a:r>
               <a:rPr lang="de-DE" sz="1800" dirty="0" smtClean="0"/>
-              <a:t>http://</a:t>
-            </a:r>
-            <a:r>
-              <a:rPr lang="de-DE" sz="1800" dirty="0" smtClean="0"/>
-              <a:t>git-scm.com/downloads/logos</a:t>
+              <a:t>http://git-scm.com/downloads/logos</a:t>
             </a:r>
           </a:p>
           <a:p>
@@ -4697,11 +4644,7 @@
             </a:pPr>
             <a:r>
               <a:rPr lang="de-DE" sz="1800" dirty="0" smtClean="0"/>
-              <a:t>http://</a:t>
-            </a:r>
-            <a:r>
-              <a:rPr lang="de-DE" sz="1800" dirty="0" smtClean="0"/>
-              <a:t>gregrickaby.com/2012/03/how-to-use-github.html</a:t>
+              <a:t>http://gregrickaby.com/2012/03/how-to-use-github.html</a:t>
             </a:r>
           </a:p>
           <a:p>
@@ -4716,7 +4659,7 @@
     </p:spTree>
     <p:extLst>
       <p:ext uri="{BB962C8B-B14F-4D97-AF65-F5344CB8AC3E}">
-        <p14:creationId xmlns="" xmlns:p14="http://schemas.microsoft.com/office/powerpoint/2010/main" val="2201789882"/>
+        <p14:creationId xmlns:p14="http://schemas.microsoft.com/office/powerpoint/2010/main" xmlns="" val="2201789882"/>
       </p:ext>
     </p:extLst>
   </p:cSld>
@@ -4805,7 +4748,7 @@
             <a:fld id="{7DD543B1-1C2F-4ECD-8715-AD3031B7BC59}" type="datetime1">
               <a:rPr lang="de-DE" smtClean="0"/>
               <a:pPr/>
-              <a:t>29.07.2012</a:t>
+              <a:t>30.07.2012</a:t>
             </a:fld>
             <a:endParaRPr lang="de-DE" dirty="0"/>
           </a:p>
@@ -4950,7 +4893,7 @@
             <a:fld id="{7DD543B1-1C2F-4ECD-8715-AD3031B7BC59}" type="datetime1">
               <a:rPr lang="de-DE" smtClean="0"/>
               <a:pPr/>
-              <a:t>29.07.2012</a:t>
+              <a:t>30.07.2012</a:t>
             </a:fld>
             <a:endParaRPr lang="de-DE" dirty="0"/>
           </a:p>
@@ -5129,7 +5072,6 @@
               <a:rPr lang="de-DE" dirty="0" smtClean="0"/>
               <a:t>Aufgabenstellung</a:t>
             </a:r>
-            <a:endParaRPr lang="de-DE" dirty="0" smtClean="0"/>
           </a:p>
           <a:p>
             <a:pPr>
@@ -5140,7 +5082,6 @@
               <a:rPr lang="de-DE" dirty="0" smtClean="0"/>
               <a:t>Versuchsaufbau</a:t>
             </a:r>
-            <a:endParaRPr lang="de-DE" dirty="0" smtClean="0"/>
           </a:p>
           <a:p>
             <a:pPr>
@@ -5171,7 +5112,6 @@
               <a:rPr lang="de-DE" dirty="0" smtClean="0"/>
               <a:t>Implementierung</a:t>
             </a:r>
-            <a:endParaRPr lang="de-DE" dirty="0" smtClean="0"/>
           </a:p>
           <a:p>
             <a:pPr>
@@ -5217,7 +5157,7 @@
             <a:fld id="{5871B3EA-D9F8-4156-97BF-B4B397DC4D61}" type="datetime1">
               <a:rPr lang="de-DE" smtClean="0"/>
               <a:pPr/>
-              <a:t>29.07.2012</a:t>
+              <a:t>30.07.2012</a:t>
             </a:fld>
             <a:endParaRPr lang="de-DE" dirty="0"/>
           </a:p>
@@ -5434,7 +5374,7 @@
     </p:spTree>
     <p:extLst>
       <p:ext uri="{BB962C8B-B14F-4D97-AF65-F5344CB8AC3E}">
-        <p14:creationId xmlns="" xmlns:p14="http://schemas.microsoft.com/office/powerpoint/2010/main" val="2201789882"/>
+        <p14:creationId xmlns:p14="http://schemas.microsoft.com/office/powerpoint/2010/main" xmlns="" val="2201789882"/>
       </p:ext>
     </p:extLst>
   </p:cSld>
@@ -5524,7 +5464,6 @@
               <a:rPr lang="de-DE" dirty="0" smtClean="0"/>
               <a:t>Software zur erzeugung künstlichen Halls erstellen</a:t>
             </a:r>
-            <a:endParaRPr lang="de-DE" dirty="0" smtClean="0"/>
           </a:p>
           <a:p>
             <a:pPr>
@@ -5535,7 +5474,6 @@
               <a:rPr lang="de-DE" dirty="0" smtClean="0"/>
               <a:t>analoges Eingangssignal mit künstlichem Hall versehen</a:t>
             </a:r>
-            <a:endParaRPr lang="de-DE" dirty="0" smtClean="0"/>
           </a:p>
           <a:p>
             <a:pPr>
@@ -5546,7 +5484,6 @@
               <a:rPr lang="de-DE" dirty="0" smtClean="0"/>
               <a:t>analoge Ausgangssignal ausgeben</a:t>
             </a:r>
-            <a:endParaRPr lang="de-DE" dirty="0" smtClean="0"/>
           </a:p>
           <a:p>
             <a:endParaRPr lang="de-DE" dirty="0" smtClean="0"/>
@@ -5578,7 +5515,7 @@
             <a:fld id="{5871B3EA-D9F8-4156-97BF-B4B397DC4D61}" type="datetime1">
               <a:rPr lang="de-DE" smtClean="0"/>
               <a:pPr/>
-              <a:t>29.07.2012</a:t>
+              <a:t>30.07.2012</a:t>
             </a:fld>
             <a:endParaRPr lang="de-DE" dirty="0"/>
           </a:p>
@@ -5682,7 +5619,6 @@
               <a:rPr lang="de-DE" dirty="0" smtClean="0"/>
               <a:t>Präsentation des Projektes</a:t>
             </a:r>
-            <a:endParaRPr lang="de-DE" dirty="0" smtClean="0"/>
           </a:p>
         </p:txBody>
       </p:sp>
@@ -5829,7 +5765,7 @@
     </p:spTree>
     <p:extLst>
       <p:ext uri="{BB962C8B-B14F-4D97-AF65-F5344CB8AC3E}">
-        <p14:creationId xmlns="" xmlns:p14="http://schemas.microsoft.com/office/powerpoint/2010/main" val="2201789882"/>
+        <p14:creationId xmlns:p14="http://schemas.microsoft.com/office/powerpoint/2010/main" xmlns="" val="2201789882"/>
       </p:ext>
     </p:extLst>
   </p:cSld>
@@ -5909,7 +5845,7 @@
             <a:fld id="{5871B3EA-D9F8-4156-97BF-B4B397DC4D61}" type="datetime1">
               <a:rPr lang="de-DE" smtClean="0"/>
               <a:pPr/>
-              <a:t>29.07.2012</a:t>
+              <a:t>30.07.2012</a:t>
             </a:fld>
             <a:endParaRPr lang="de-DE" dirty="0"/>
           </a:p>
@@ -5997,7 +5933,7 @@
           <a:p>
             <a:r>
               <a:rPr lang="de-DE" dirty="0" smtClean="0"/>
-              <a:t>Implementierung:</a:t>
+              <a:t>Demonstration:</a:t>
             </a:r>
             <a:endParaRPr lang="en-US" dirty="0"/>
           </a:p>
@@ -6058,20 +5994,6 @@
               </a:rPr>
               <a:t>Signalgenerator erzeugt gewähltes Eingangssignal</a:t>
             </a:r>
-            <a:endParaRPr kumimoji="0" lang="de-DE" sz="1800" b="0" i="0" u="none" strike="noStrike" kern="0" cap="none" spc="0" normalizeH="0" baseline="0" noProof="0" dirty="0" smtClean="0">
-              <a:ln>
-                <a:noFill/>
-              </a:ln>
-              <a:solidFill>
-                <a:schemeClr val="tx1"/>
-              </a:solidFill>
-              <a:effectLst/>
-              <a:uLnTx/>
-              <a:uFillTx/>
-              <a:latin typeface="Arial Narrow" pitchFamily="34" charset="0"/>
-              <a:ea typeface="+mn-ea"/>
-              <a:cs typeface="+mn-cs"/>
-            </a:endParaRPr>
           </a:p>
           <a:p>
             <a:pPr marL="0" marR="0" lvl="0" indent="0" algn="l" defTabSz="914400" rtl="0" eaLnBrk="0" fontAlgn="base" latinLnBrk="0" hangingPunct="0">
@@ -6230,7 +6152,7 @@
               <a:defRPr/>
             </a:pPr>
             <a:r>
-              <a:rPr kumimoji="0" lang="de-DE" sz="1800" b="1" i="0" u="none" strike="noStrike" kern="0" cap="none" spc="0" normalizeH="0" baseline="0" noProof="0" smtClean="0">
+              <a:rPr kumimoji="0" lang="de-DE" sz="1800" b="1" i="0" u="none" strike="noStrike" kern="0" cap="none" spc="0" normalizeH="0" baseline="0" noProof="0" dirty="0" smtClean="0">
                 <a:ln>
                   <a:noFill/>
                 </a:ln>
@@ -6318,20 +6240,6 @@
               </a:rPr>
               <a:t>analoges Eingangssignal vom Mikrophon</a:t>
             </a:r>
-            <a:endParaRPr kumimoji="0" lang="de-DE" sz="1800" b="0" i="0" u="none" strike="noStrike" kern="0" cap="none" spc="0" normalizeH="0" baseline="0" noProof="0" dirty="0" smtClean="0">
-              <a:ln>
-                <a:noFill/>
-              </a:ln>
-              <a:solidFill>
-                <a:schemeClr val="tx1"/>
-              </a:solidFill>
-              <a:effectLst/>
-              <a:uLnTx/>
-              <a:uFillTx/>
-              <a:latin typeface="Arial Narrow" pitchFamily="34" charset="0"/>
-              <a:ea typeface="+mn-ea"/>
-              <a:cs typeface="+mn-cs"/>
-            </a:endParaRPr>
           </a:p>
           <a:p>
             <a:pPr marL="0" marR="0" lvl="0" indent="0" algn="l" defTabSz="914400" rtl="0" eaLnBrk="0" fontAlgn="base" latinLnBrk="0" hangingPunct="0">
@@ -6462,7 +6370,7 @@
     </p:spTree>
     <p:extLst>
       <p:ext uri="{BB962C8B-B14F-4D97-AF65-F5344CB8AC3E}">
-        <p14:creationId xmlns="" xmlns:p14="http://schemas.microsoft.com/office/powerpoint/2010/main" val="2201789882"/>
+        <p14:creationId xmlns:p14="http://schemas.microsoft.com/office/powerpoint/2010/main" xmlns="" val="2201789882"/>
       </p:ext>
     </p:extLst>
   </p:cSld>
@@ -6542,7 +6450,7 @@
             <a:fld id="{5871B3EA-D9F8-4156-97BF-B4B397DC4D61}" type="datetime1">
               <a:rPr lang="de-DE" smtClean="0"/>
               <a:pPr/>
-              <a:t>29.07.2012</a:t>
+              <a:t>30.07.2012</a:t>
             </a:fld>
             <a:endParaRPr lang="de-DE" dirty="0"/>
           </a:p>
@@ -6636,7 +6544,6 @@
               <a:rPr lang="de-DE" dirty="0" smtClean="0"/>
               <a:t>analoges Eingangssignal x(t)</a:t>
             </a:r>
-            <a:endParaRPr lang="de-DE" dirty="0" smtClean="0"/>
           </a:p>
           <a:p>
             <a:pPr>
@@ -6783,15 +6690,7 @@
           <a:p>
             <a:r>
               <a:rPr lang="de-DE" sz="900" dirty="0" smtClean="0"/>
-              <a:t>Quelle: Versuchsanleitung „Digitale </a:t>
-            </a:r>
-            <a:r>
-              <a:rPr lang="de-DE" sz="900" dirty="0" smtClean="0"/>
-              <a:t>Filter</a:t>
-            </a:r>
-            <a:r>
-              <a:rPr lang="de-DE" sz="900" dirty="0" smtClean="0"/>
-              <a:t>“</a:t>
+              <a:t>Quelle: Versuchsanleitung „Digitale Filter“</a:t>
             </a:r>
             <a:endParaRPr lang="en-US" sz="900" dirty="0"/>
           </a:p>
@@ -6800,7 +6699,7 @@
     </p:spTree>
     <p:extLst>
       <p:ext uri="{BB962C8B-B14F-4D97-AF65-F5344CB8AC3E}">
-        <p14:creationId xmlns="" xmlns:p14="http://schemas.microsoft.com/office/powerpoint/2010/main" val="2201789882"/>
+        <p14:creationId xmlns:p14="http://schemas.microsoft.com/office/powerpoint/2010/main" xmlns="" val="2201789882"/>
       </p:ext>
     </p:extLst>
   </p:cSld>
@@ -7320,7 +7219,7 @@
             <a:fld id="{5871B3EA-D9F8-4156-97BF-B4B397DC4D61}" type="datetime1">
               <a:rPr lang="de-DE" smtClean="0"/>
               <a:pPr/>
-              <a:t>29.07.2012</a:t>
+              <a:t>30.07.2012</a:t>
             </a:fld>
             <a:endParaRPr lang="de-DE" dirty="0"/>
           </a:p>
@@ -7414,7 +7313,6 @@
               <a:rPr lang="de-DE" dirty="0" smtClean="0"/>
               <a:t>kontinuierliche Reflexionen einer Schallwelle</a:t>
             </a:r>
-            <a:endParaRPr lang="de-DE" dirty="0" smtClean="0"/>
           </a:p>
           <a:p>
             <a:pPr>
@@ -7472,7 +7370,6 @@
               <a:rPr lang="de-DE" sz="1400" dirty="0" smtClean="0"/>
               <a:t>diffuser Nachhall</a:t>
             </a:r>
-            <a:endParaRPr lang="de-DE" sz="1400" dirty="0" smtClean="0"/>
           </a:p>
           <a:p>
             <a:pPr>
@@ -7503,7 +7400,6 @@
               <a:rPr lang="de-DE" sz="1400" dirty="0" smtClean="0"/>
               <a:t>Reflektionen</a:t>
             </a:r>
-            <a:endParaRPr lang="de-DE" sz="1400" dirty="0" smtClean="0"/>
           </a:p>
         </p:txBody>
       </p:sp>
@@ -7557,11 +7453,7 @@
           <a:p>
             <a:r>
               <a:rPr lang="de-DE" sz="900" dirty="0" smtClean="0"/>
-              <a:t>Quelle: </a:t>
-            </a:r>
-            <a:r>
-              <a:rPr lang="de-DE" sz="900" dirty="0" smtClean="0"/>
-              <a:t>http://feedingthepuppy.typepad.com</a:t>
+              <a:t>Quelle: http://feedingthepuppy.typepad.com</a:t>
             </a:r>
             <a:endParaRPr lang="en-US" sz="900" dirty="0"/>
           </a:p>
@@ -7570,7 +7462,7 @@
     </p:spTree>
     <p:extLst>
       <p:ext uri="{BB962C8B-B14F-4D97-AF65-F5344CB8AC3E}">
-        <p14:creationId xmlns="" xmlns:p14="http://schemas.microsoft.com/office/powerpoint/2010/main" val="2201789882"/>
+        <p14:creationId xmlns:p14="http://schemas.microsoft.com/office/powerpoint/2010/main" xmlns="" val="2201789882"/>
       </p:ext>
     </p:extLst>
   </p:cSld>
@@ -7650,7 +7542,7 @@
             <a:fld id="{5871B3EA-D9F8-4156-97BF-B4B397DC4D61}" type="datetime1">
               <a:rPr lang="de-DE" smtClean="0"/>
               <a:pPr/>
-              <a:t>29.07.2012</a:t>
+              <a:t>30.07.2012</a:t>
             </a:fld>
             <a:endParaRPr lang="de-DE" dirty="0"/>
           </a:p>
@@ -7853,11 +7745,7 @@
           <a:p>
             <a:r>
               <a:rPr lang="de-DE" sz="900" dirty="0" smtClean="0"/>
-              <a:t>Quelle: http</a:t>
-            </a:r>
-            <a:r>
-              <a:rPr lang="de-DE" sz="900" dirty="0" smtClean="0"/>
-              <a:t>://git-scm.com</a:t>
+              <a:t>Quelle: http://git-scm.com</a:t>
             </a:r>
             <a:endParaRPr lang="en-US" sz="900" dirty="0"/>
           </a:p>
@@ -7886,15 +7774,7 @@
           <a:p>
             <a:r>
               <a:rPr lang="de-DE" sz="900" dirty="0" smtClean="0"/>
-              <a:t>Quelle: </a:t>
-            </a:r>
-            <a:r>
-              <a:rPr lang="de-DE" sz="900" dirty="0" smtClean="0"/>
-              <a:t>http://</a:t>
-            </a:r>
-            <a:r>
-              <a:rPr lang="de-DE" sz="900" dirty="0" smtClean="0"/>
-              <a:t>gregrickaby.com</a:t>
+              <a:t>Quelle: http://gregrickaby.com</a:t>
             </a:r>
             <a:endParaRPr lang="en-US" sz="900" dirty="0"/>
           </a:p>
@@ -7903,7 +7783,7 @@
     </p:spTree>
     <p:extLst>
       <p:ext uri="{BB962C8B-B14F-4D97-AF65-F5344CB8AC3E}">
-        <p14:creationId xmlns="" xmlns:p14="http://schemas.microsoft.com/office/powerpoint/2010/main" val="2201789882"/>
+        <p14:creationId xmlns:p14="http://schemas.microsoft.com/office/powerpoint/2010/main" xmlns="" val="2201789882"/>
       </p:ext>
     </p:extLst>
   </p:cSld>
@@ -7983,7 +7863,7 @@
             <a:fld id="{5871B3EA-D9F8-4156-97BF-B4B397DC4D61}" type="datetime1">
               <a:rPr lang="de-DE" smtClean="0"/>
               <a:pPr/>
-              <a:t>29.07.2012</a:t>
+              <a:t>30.07.2012</a:t>
             </a:fld>
             <a:endParaRPr lang="de-DE" dirty="0"/>
           </a:p>
@@ -8236,7 +8116,7 @@
     </p:spTree>
     <p:extLst>
       <p:ext uri="{BB962C8B-B14F-4D97-AF65-F5344CB8AC3E}">
-        <p14:creationId xmlns="" xmlns:p14="http://schemas.microsoft.com/office/powerpoint/2010/main" val="2201789882"/>
+        <p14:creationId xmlns:p14="http://schemas.microsoft.com/office/powerpoint/2010/main" xmlns="" val="2201789882"/>
       </p:ext>
     </p:extLst>
   </p:cSld>
@@ -8316,7 +8196,7 @@
             <a:fld id="{5871B3EA-D9F8-4156-97BF-B4B397DC4D61}" type="datetime1">
               <a:rPr lang="de-DE" smtClean="0"/>
               <a:pPr/>
-              <a:t>29.07.2012</a:t>
+              <a:t>30.07.2012</a:t>
             </a:fld>
             <a:endParaRPr lang="de-DE" dirty="0"/>
           </a:p>
@@ -8473,12 +8353,12 @@
           <p:nvPr/>
         </p:nvGraphicFramePr>
         <p:xfrm>
-          <a:off x="1249317" y="2735253"/>
-          <a:ext cx="1266039" cy="349252"/>
+          <a:off x="1184275" y="2735263"/>
+          <a:ext cx="1397000" cy="349250"/>
         </p:xfrm>
         <a:graphic>
           <a:graphicData uri="http://schemas.openxmlformats.org/presentationml/2006/ole">
-            <p:oleObj spid="_x0000_s7170" name="Equation" r:id="rId3" imgW="736560" imgH="203040" progId="Equation.3">
+            <p:oleObj spid="_x0000_s7170" name="Equation" r:id="rId3" imgW="812520" imgH="203040" progId="Equation.3">
               <p:embed/>
             </p:oleObj>
           </a:graphicData>
@@ -8541,7 +8421,7 @@
     </p:spTree>
     <p:extLst>
       <p:ext uri="{BB962C8B-B14F-4D97-AF65-F5344CB8AC3E}">
-        <p14:creationId xmlns="" xmlns:p14="http://schemas.microsoft.com/office/powerpoint/2010/main" val="2201789882"/>
+        <p14:creationId xmlns:p14="http://schemas.microsoft.com/office/powerpoint/2010/main" xmlns="" val="2201789882"/>
       </p:ext>
     </p:extLst>
   </p:cSld>

</xml_diff>